<commit_message>
0326 행위 crud 구상
</commit_message>
<xml_diff>
--- a/2022JAVA_YSH 1/DBproject/부산시 COVID-19 _3조_PPT.pptx
+++ b/2022JAVA_YSH 1/DBproject/부산시 COVID-19 _3조_PPT.pptx
@@ -591,7 +591,7 @@
           <a:p>
             <a:fld id="{47E5113B-167A-45E0-8DD5-EF57E232A0AC}" type="datetimeFigureOut">
               <a:rPr lang="ko-KR" altLang="en-US" smtClean="0"/>
-              <a:t>2022-03-25</a:t>
+              <a:t>2022. 3. 26.</a:t>
             </a:fld>
             <a:endParaRPr lang="ko-KR" altLang="en-US"/>
           </a:p>
@@ -789,7 +789,7 @@
           <a:p>
             <a:fld id="{47E5113B-167A-45E0-8DD5-EF57E232A0AC}" type="datetimeFigureOut">
               <a:rPr lang="ko-KR" altLang="en-US" smtClean="0"/>
-              <a:t>2022-03-25</a:t>
+              <a:t>2022. 3. 26.</a:t>
             </a:fld>
             <a:endParaRPr lang="ko-KR" altLang="en-US"/>
           </a:p>
@@ -997,7 +997,7 @@
           <a:p>
             <a:fld id="{47E5113B-167A-45E0-8DD5-EF57E232A0AC}" type="datetimeFigureOut">
               <a:rPr lang="ko-KR" altLang="en-US" smtClean="0"/>
-              <a:t>2022-03-25</a:t>
+              <a:t>2022. 3. 26.</a:t>
             </a:fld>
             <a:endParaRPr lang="ko-KR" altLang="en-US"/>
           </a:p>
@@ -1326,7 +1326,7 @@
           <a:p>
             <a:fld id="{47E5113B-167A-45E0-8DD5-EF57E232A0AC}" type="datetimeFigureOut">
               <a:rPr lang="ko-KR" altLang="en-US" smtClean="0"/>
-              <a:t>2022-03-25</a:t>
+              <a:t>2022. 3. 26.</a:t>
             </a:fld>
             <a:endParaRPr lang="ko-KR" altLang="en-US"/>
           </a:p>
@@ -1601,7 +1601,7 @@
           <a:p>
             <a:fld id="{47E5113B-167A-45E0-8DD5-EF57E232A0AC}" type="datetimeFigureOut">
               <a:rPr lang="ko-KR" altLang="en-US" smtClean="0"/>
-              <a:t>2022-03-25</a:t>
+              <a:t>2022. 3. 26.</a:t>
             </a:fld>
             <a:endParaRPr lang="ko-KR" altLang="en-US"/>
           </a:p>
@@ -1866,7 +1866,7 @@
           <a:p>
             <a:fld id="{47E5113B-167A-45E0-8DD5-EF57E232A0AC}" type="datetimeFigureOut">
               <a:rPr lang="ko-KR" altLang="en-US" smtClean="0"/>
-              <a:t>2022-03-25</a:t>
+              <a:t>2022. 3. 26.</a:t>
             </a:fld>
             <a:endParaRPr lang="ko-KR" altLang="en-US"/>
           </a:p>
@@ -2278,7 +2278,7 @@
           <a:p>
             <a:fld id="{47E5113B-167A-45E0-8DD5-EF57E232A0AC}" type="datetimeFigureOut">
               <a:rPr lang="ko-KR" altLang="en-US" smtClean="0"/>
-              <a:t>2022-03-25</a:t>
+              <a:t>2022. 3. 26.</a:t>
             </a:fld>
             <a:endParaRPr lang="ko-KR" altLang="en-US"/>
           </a:p>
@@ -2419,7 +2419,7 @@
           <a:p>
             <a:fld id="{47E5113B-167A-45E0-8DD5-EF57E232A0AC}" type="datetimeFigureOut">
               <a:rPr lang="ko-KR" altLang="en-US" smtClean="0"/>
-              <a:t>2022-03-25</a:t>
+              <a:t>2022. 3. 26.</a:t>
             </a:fld>
             <a:endParaRPr lang="ko-KR" altLang="en-US"/>
           </a:p>
@@ -2532,7 +2532,7 @@
           <a:p>
             <a:fld id="{47E5113B-167A-45E0-8DD5-EF57E232A0AC}" type="datetimeFigureOut">
               <a:rPr lang="ko-KR" altLang="en-US" smtClean="0"/>
-              <a:t>2022-03-25</a:t>
+              <a:t>2022. 3. 26.</a:t>
             </a:fld>
             <a:endParaRPr lang="ko-KR" altLang="en-US"/>
           </a:p>
@@ -2843,7 +2843,7 @@
           <a:p>
             <a:fld id="{47E5113B-167A-45E0-8DD5-EF57E232A0AC}" type="datetimeFigureOut">
               <a:rPr lang="ko-KR" altLang="en-US" smtClean="0"/>
-              <a:t>2022-03-25</a:t>
+              <a:t>2022. 3. 26.</a:t>
             </a:fld>
             <a:endParaRPr lang="ko-KR" altLang="en-US"/>
           </a:p>
@@ -3131,7 +3131,7 @@
           <a:p>
             <a:fld id="{47E5113B-167A-45E0-8DD5-EF57E232A0AC}" type="datetimeFigureOut">
               <a:rPr lang="ko-KR" altLang="en-US" smtClean="0"/>
-              <a:t>2022-03-25</a:t>
+              <a:t>2022. 3. 26.</a:t>
             </a:fld>
             <a:endParaRPr lang="ko-KR" altLang="en-US"/>
           </a:p>
@@ -3372,7 +3372,7 @@
           <a:p>
             <a:fld id="{47E5113B-167A-45E0-8DD5-EF57E232A0AC}" type="datetimeFigureOut">
               <a:rPr lang="ko-KR" altLang="en-US" smtClean="0"/>
-              <a:t>2022-03-25</a:t>
+              <a:t>2022. 3. 26.</a:t>
             </a:fld>
             <a:endParaRPr lang="ko-KR" altLang="en-US"/>
           </a:p>
@@ -12154,8 +12154,12 @@
               <a:t>테이블 명 </a:t>
             </a:r>
             <a:r>
+              <a:rPr lang="en-US" altLang="ko-KR" sz="2000"/>
+              <a:t>: PATIENT_</a:t>
+            </a:r>
+            <a:r>
               <a:rPr lang="en-US" altLang="ko-KR" sz="2000" dirty="0"/>
-              <a:t>: PATIENTS_TBL</a:t>
+              <a:t>TBL</a:t>
             </a:r>
             <a:endParaRPr lang="ko-KR" altLang="en-US" sz="2000" dirty="0"/>
           </a:p>

</xml_diff>